<commit_message>
Added remaining REST End-points.
</commit_message>
<xml_diff>
--- a/Developing with Spring Boot.pptx
+++ b/Developing with Spring Boot.pptx
@@ -13387,7 +13387,9 @@
         </p:nvSpPr>
         <p:spPr/>
         <p:txBody>
-          <a:bodyPr/>
+          <a:bodyPr>
+            <a:normAutofit lnSpcReduction="10000"/>
+          </a:bodyPr>
           <a:p>
             <a:r>
               <a:rPr lang="en-US"/>
@@ -13524,6 +13526,14 @@
             <a:r>
               <a:rPr lang="en-US"/>
               <a:t>IncorrectDateFormatException.java</a:t>
+            </a:r>
+            <a:endParaRPr lang="en-US"/>
+          </a:p>
+          <a:p>
+            <a:pPr lvl="1"/>
+            <a:r>
+              <a:rPr lang="en-US"/>
+              <a:t>UserNotFoundException.java</a:t>
             </a:r>
             <a:endParaRPr lang="en-US"/>
           </a:p>
@@ -14224,37 +14234,37 @@
               <a:buNone/>
             </a:pPr>
             <a:r>
-              <a:rPr lang="en-US" sz="1800"/>
+              <a:rPr lang="en-US" sz="1700"/>
               <a:t>public interface UserRepository extends JpaRepository&lt;User, String&gt;{	</a:t>
             </a:r>
-            <a:endParaRPr lang="en-US" sz="1800"/>
+            <a:endParaRPr lang="en-US" sz="1700"/>
           </a:p>
           <a:p>
             <a:pPr marL="0" indent="0">
               <a:buNone/>
             </a:pPr>
             <a:r>
-              <a:rPr lang="en-US" sz="1800"/>
+              <a:rPr lang="en-US" sz="1700"/>
               <a:t>	&lt;T&gt;T findDtoedByUserName(String userName, Class&lt;T&gt; dto);</a:t>
             </a:r>
-            <a:endParaRPr lang="en-US" sz="1800"/>
+            <a:endParaRPr lang="en-US" sz="1700"/>
           </a:p>
           <a:p>
             <a:pPr marL="0" indent="0">
               <a:buNone/>
             </a:pPr>
             <a:r>
-              <a:rPr lang="en-US" sz="1800"/>
-              <a:t>	&lt;T&gt;T findAllDtoedByRoleRoleCode(String roleCode, Class&lt;T&gt; dto);</a:t>
-            </a:r>
-            <a:endParaRPr lang="en-US" sz="1800"/>
+              <a:rPr lang="en-US" sz="1700"/>
+              <a:t>	&lt;T&gt;List&lt;T&gt; findAllDtoedByRoleRoleCode(String roleCode, Class&lt;T&gt; dto);</a:t>
+            </a:r>
+            <a:endParaRPr lang="en-US" sz="1700"/>
           </a:p>
           <a:p>
             <a:pPr marL="0" indent="0">
               <a:buNone/>
             </a:pPr>
             <a:r>
-              <a:rPr lang="en-US" sz="1800"/>
+              <a:rPr lang="en-US" sz="1700"/>
               <a:t>}</a:t>
             </a:r>
             <a:endParaRPr lang="en-US" sz="2000"/>
@@ -14286,40 +14296,40 @@
               <a:buNone/>
             </a:pPr>
             <a:r>
-              <a:rPr lang="en-US" sz="1800"/>
+              <a:rPr lang="en-US" sz="1700"/>
               <a:t>public interface AddressRepository extends JpaRepository&lt;Address, Long&gt;{</a:t>
             </a:r>
-            <a:endParaRPr lang="en-US" sz="1800"/>
+            <a:endParaRPr lang="en-US" sz="1700"/>
           </a:p>
           <a:p>
             <a:pPr marL="0" indent="0">
               <a:buNone/>
             </a:pPr>
             <a:r>
-              <a:rPr lang="en-US" sz="1800"/>
-              <a:t>	&lt;T&gt;List&lt;T&gt; findDtoedByUserUserName(String userName, Class&lt;T&gt; projection);</a:t>
-            </a:r>
-            <a:endParaRPr lang="en-US" sz="1800"/>
+              <a:rPr lang="en-US" sz="1700"/>
+              <a:t>	&lt;T&gt;List&lt;T&gt; findAllDtoedByUserUserName(String userName, Class&lt;T&gt; projection);</a:t>
+            </a:r>
+            <a:endParaRPr lang="en-US" sz="1700"/>
           </a:p>
           <a:p>
             <a:pPr marL="0" indent="0">
               <a:buNone/>
             </a:pPr>
             <a:r>
-              <a:rPr lang="en-US" sz="1800"/>
-              <a:t>	&lt;T&gt;List&lt;T&gt; findProjectedByUserUserName(String userName, Class&lt;T&gt; projection);</a:t>
-            </a:r>
-            <a:endParaRPr lang="en-US" sz="1800"/>
+              <a:rPr lang="en-US" sz="1700"/>
+              <a:t>	&lt;T&gt;List&lt;T&gt; findAllProjectedByUserUserName(String userName, Class&lt;T&gt; projection);</a:t>
+            </a:r>
+            <a:endParaRPr lang="en-US" sz="1700"/>
           </a:p>
           <a:p>
             <a:pPr marL="0" indent="0">
               <a:buNone/>
             </a:pPr>
             <a:r>
-              <a:rPr lang="en-US" sz="1800"/>
+              <a:rPr lang="en-US" sz="1700"/>
               <a:t>}</a:t>
             </a:r>
-            <a:endParaRPr lang="en-US" sz="1800"/>
+            <a:endParaRPr lang="en-US" sz="1700"/>
           </a:p>
         </p:txBody>
       </p:sp>

</xml_diff>